<commit_message>
Mid_Presentation.pptx - final edit
</commit_message>
<xml_diff>
--- a/Presentation/Mid_Presentation.pptx
+++ b/Presentation/Mid_Presentation.pptx
@@ -612,11 +612,7 @@
           <a:p>
             <a:r>
               <a:rPr lang="he-IL" dirty="0" smtClean="0"/>
-              <a:t>לצורך סימולציה של תמונה לא </a:t>
-            </a:r>
-            <a:r>
-              <a:rPr lang="he-IL" dirty="0" smtClean="0"/>
-              <a:t>דחוסה בגודל</a:t>
+              <a:t>לצורך סימולציה של תמונה לא דחוסה בגודל</a:t>
             </a:r>
             <a:r>
               <a:rPr lang="he-IL" baseline="0" dirty="0" smtClean="0"/>
@@ -19180,14 +19176,14 @@
             <p:ph idx="1"/>
             <p:extLst>
               <p:ext uri="{D42A27DB-BD31-4B8C-83A1-F6EECF244321}">
-                <p14:modId xmlns:p14="http://schemas.microsoft.com/office/powerpoint/2010/main" val="841581898"/>
+                <p14:modId xmlns:p14="http://schemas.microsoft.com/office/powerpoint/2010/main" val="3485026555"/>
               </p:ext>
             </p:extLst>
           </p:nvPr>
         </p:nvGraphicFramePr>
         <p:xfrm>
           <a:off x="457200" y="1481138"/>
-          <a:ext cx="8229600" cy="2595880"/>
+          <a:ext cx="8229600" cy="2865120"/>
         </p:xfrm>
         <a:graphic>
           <a:graphicData uri="http://schemas.openxmlformats.org/drawingml/2006/table">
@@ -19220,10 +19216,10 @@
                     <a:bodyPr/>
                     <a:lstStyle/>
                     <a:p>
-                      <a:pPr algn="l" rtl="0"/>
+                      <a:pPr algn="ctr" rtl="0"/>
                       <a:r>
                         <a:rPr lang="en-US" dirty="0" smtClean="0"/>
-                        <a:t>Week</a:t>
+                        <a:t>Month</a:t>
                       </a:r>
                       <a:endParaRPr lang="he-IL" dirty="0"/>
                     </a:p>
@@ -19240,8 +19236,13 @@
                       <a:pPr algn="l" rtl="0"/>
                       <a:r>
                         <a:rPr lang="en-US" dirty="0" smtClean="0"/>
-                        <a:t>Exams period</a:t>
+                        <a:t>Exams </a:t>
                       </a:r>
+                      <a:r>
+                        <a:rPr lang="en-US" dirty="0" smtClean="0"/>
+                        <a:t>Period</a:t>
+                      </a:r>
+                      <a:endParaRPr lang="en-US" dirty="0" smtClean="0"/>
                     </a:p>
                   </a:txBody>
                   <a:tcPr/>
@@ -19290,7 +19291,7 @@
                       <a:pPr algn="ctr" rtl="0"/>
                       <a:r>
                         <a:rPr lang="en-US" dirty="0" smtClean="0"/>
-                        <a:t>March</a:t>
+                        <a:t>March - April</a:t>
                       </a:r>
                       <a:endParaRPr lang="he-IL" dirty="0"/>
                     </a:p>
@@ -19307,7 +19308,11 @@
                       <a:pPr algn="l"/>
                       <a:r>
                         <a:rPr lang="en-US" dirty="0" smtClean="0"/>
-                        <a:t>Simulations and Debugging</a:t>
+                        <a:t>Final Presentation</a:t>
+                      </a:r>
+                      <a:r>
+                        <a:rPr lang="en-US" baseline="0" dirty="0" smtClean="0"/>
+                        <a:t> – Part A</a:t>
                       </a:r>
                       <a:endParaRPr lang="he-IL" dirty="0"/>
                     </a:p>
@@ -19338,7 +19343,7 @@
                       </a:pPr>
                       <a:r>
                         <a:rPr lang="en-US" dirty="0" smtClean="0"/>
-                        <a:t>April</a:t>
+                        <a:t>May</a:t>
                       </a:r>
                       <a:endParaRPr lang="he-IL" dirty="0" smtClean="0"/>
                     </a:p>
@@ -19355,15 +19360,7 @@
                       <a:pPr algn="l" rtl="0"/>
                       <a:r>
                         <a:rPr lang="en-US" dirty="0" smtClean="0"/>
-                        <a:t>Synthesis, 2</a:t>
-                      </a:r>
-                      <a:r>
-                        <a:rPr lang="en-US" baseline="30000" dirty="0" smtClean="0"/>
-                        <a:t>nd</a:t>
-                      </a:r>
-                      <a:r>
-                        <a:rPr lang="en-US" baseline="0" dirty="0" smtClean="0"/>
-                        <a:t> Presentation</a:t>
+                        <a:t>Synthesis</a:t>
                       </a:r>
                       <a:endParaRPr lang="he-IL" dirty="0"/>
                     </a:p>
@@ -19378,7 +19375,7 @@
                       <a:pPr algn="ctr" rtl="0"/>
                       <a:r>
                         <a:rPr lang="en-US" dirty="0" smtClean="0"/>
-                        <a:t>May</a:t>
+                        <a:t>May - June</a:t>
                       </a:r>
                       <a:endParaRPr lang="he-IL" dirty="0"/>
                     </a:p>
@@ -19411,7 +19408,7 @@
                       </a:pPr>
                       <a:r>
                         <a:rPr lang="en-US" dirty="0" smtClean="0"/>
-                        <a:t>Integration and Lab testing </a:t>
+                        <a:t>Exam Period</a:t>
                       </a:r>
                       <a:endParaRPr lang="he-IL" dirty="0" smtClean="0"/>
                     </a:p>
@@ -19426,7 +19423,7 @@
                       <a:pPr algn="ctr" rtl="0"/>
                       <a:r>
                         <a:rPr lang="en-US" dirty="0" smtClean="0"/>
-                        <a:t>June</a:t>
+                        <a:t>July</a:t>
                       </a:r>
                       <a:endParaRPr lang="he-IL" dirty="0"/>
                     </a:p>
@@ -19459,7 +19456,7 @@
                       </a:pPr>
                       <a:r>
                         <a:rPr lang="en-US" dirty="0" smtClean="0"/>
-                        <a:t>Final Presentation </a:t>
+                        <a:t>Integration and lab</a:t>
                       </a:r>
                       <a:endParaRPr lang="he-IL" dirty="0" smtClean="0"/>
                     </a:p>
@@ -19474,7 +19471,11 @@
                       <a:pPr algn="ctr" rtl="0"/>
                       <a:r>
                         <a:rPr lang="en-US" dirty="0" smtClean="0"/>
-                        <a:t>July</a:t>
+                        <a:t>August</a:t>
+                      </a:r>
+                      <a:r>
+                        <a:rPr lang="en-US" baseline="0" dirty="0" smtClean="0"/>
+                        <a:t> - September</a:t>
                       </a:r>
                       <a:endParaRPr lang="he-IL" dirty="0"/>
                     </a:p>

</xml_diff>